<commit_message>
remove frames from arch.png
</commit_message>
<xml_diff>
--- a/en/asset/mai-arch.pptx
+++ b/en/asset/mai-arch.pptx
@@ -198,7 +198,7 @@
           <a:p>
             <a:fld id="{B026110B-5B1F-4063-BCA6-030140F75AD4}" type="datetimeFigureOut">
               <a:rPr lang="zh-CN" altLang="en-US" smtClean="0"/>
-              <a:t>2019/12/4</a:t>
+              <a:t>2019/12/5</a:t>
             </a:fld>
             <a:endParaRPr lang="zh-CN" altLang="en-US"/>
           </a:p>
@@ -696,7 +696,7 @@
           <a:p>
             <a:fld id="{F5070D61-C366-4358-8D3B-3705082AF76F}" type="datetimeFigureOut">
               <a:rPr lang="zh-CN" altLang="en-US" smtClean="0"/>
-              <a:t>2019/12/4</a:t>
+              <a:t>2019/12/5</a:t>
             </a:fld>
             <a:endParaRPr lang="zh-CN" altLang="en-US"/>
           </a:p>
@@ -894,7 +894,7 @@
           <a:p>
             <a:fld id="{F5070D61-C366-4358-8D3B-3705082AF76F}" type="datetimeFigureOut">
               <a:rPr lang="zh-CN" altLang="en-US" smtClean="0"/>
-              <a:t>2019/12/4</a:t>
+              <a:t>2019/12/5</a:t>
             </a:fld>
             <a:endParaRPr lang="zh-CN" altLang="en-US"/>
           </a:p>
@@ -1102,7 +1102,7 @@
           <a:p>
             <a:fld id="{F5070D61-C366-4358-8D3B-3705082AF76F}" type="datetimeFigureOut">
               <a:rPr lang="zh-CN" altLang="en-US" smtClean="0"/>
-              <a:t>2019/12/4</a:t>
+              <a:t>2019/12/5</a:t>
             </a:fld>
             <a:endParaRPr lang="zh-CN" altLang="en-US"/>
           </a:p>
@@ -1300,7 +1300,7 @@
           <a:p>
             <a:fld id="{F5070D61-C366-4358-8D3B-3705082AF76F}" type="datetimeFigureOut">
               <a:rPr lang="zh-CN" altLang="en-US" smtClean="0"/>
-              <a:t>2019/12/4</a:t>
+              <a:t>2019/12/5</a:t>
             </a:fld>
             <a:endParaRPr lang="zh-CN" altLang="en-US"/>
           </a:p>
@@ -1575,7 +1575,7 @@
           <a:p>
             <a:fld id="{F5070D61-C366-4358-8D3B-3705082AF76F}" type="datetimeFigureOut">
               <a:rPr lang="zh-CN" altLang="en-US" smtClean="0"/>
-              <a:t>2019/12/4</a:t>
+              <a:t>2019/12/5</a:t>
             </a:fld>
             <a:endParaRPr lang="zh-CN" altLang="en-US"/>
           </a:p>
@@ -1840,7 +1840,7 @@
           <a:p>
             <a:fld id="{F5070D61-C366-4358-8D3B-3705082AF76F}" type="datetimeFigureOut">
               <a:rPr lang="zh-CN" altLang="en-US" smtClean="0"/>
-              <a:t>2019/12/4</a:t>
+              <a:t>2019/12/5</a:t>
             </a:fld>
             <a:endParaRPr lang="zh-CN" altLang="en-US"/>
           </a:p>
@@ -2252,7 +2252,7 @@
           <a:p>
             <a:fld id="{F5070D61-C366-4358-8D3B-3705082AF76F}" type="datetimeFigureOut">
               <a:rPr lang="zh-CN" altLang="en-US" smtClean="0"/>
-              <a:t>2019/12/4</a:t>
+              <a:t>2019/12/5</a:t>
             </a:fld>
             <a:endParaRPr lang="zh-CN" altLang="en-US"/>
           </a:p>
@@ -2393,7 +2393,7 @@
           <a:p>
             <a:fld id="{F5070D61-C366-4358-8D3B-3705082AF76F}" type="datetimeFigureOut">
               <a:rPr lang="zh-CN" altLang="en-US" smtClean="0"/>
-              <a:t>2019/12/4</a:t>
+              <a:t>2019/12/5</a:t>
             </a:fld>
             <a:endParaRPr lang="zh-CN" altLang="en-US"/>
           </a:p>
@@ -2506,7 +2506,7 @@
           <a:p>
             <a:fld id="{F5070D61-C366-4358-8D3B-3705082AF76F}" type="datetimeFigureOut">
               <a:rPr lang="zh-CN" altLang="en-US" smtClean="0"/>
-              <a:t>2019/12/4</a:t>
+              <a:t>2019/12/5</a:t>
             </a:fld>
             <a:endParaRPr lang="zh-CN" altLang="en-US"/>
           </a:p>
@@ -2817,7 +2817,7 @@
           <a:p>
             <a:fld id="{F5070D61-C366-4358-8D3B-3705082AF76F}" type="datetimeFigureOut">
               <a:rPr lang="zh-CN" altLang="en-US" smtClean="0"/>
-              <a:t>2019/12/4</a:t>
+              <a:t>2019/12/5</a:t>
             </a:fld>
             <a:endParaRPr lang="zh-CN" altLang="en-US"/>
           </a:p>
@@ -3105,7 +3105,7 @@
           <a:p>
             <a:fld id="{F5070D61-C366-4358-8D3B-3705082AF76F}" type="datetimeFigureOut">
               <a:rPr lang="zh-CN" altLang="en-US" smtClean="0"/>
-              <a:t>2019/12/4</a:t>
+              <a:t>2019/12/5</a:t>
             </a:fld>
             <a:endParaRPr lang="zh-CN" altLang="en-US"/>
           </a:p>
@@ -3346,7 +3346,7 @@
           <a:p>
             <a:fld id="{F5070D61-C366-4358-8D3B-3705082AF76F}" type="datetimeFigureOut">
               <a:rPr lang="zh-CN" altLang="en-US" smtClean="0"/>
-              <a:t>2019/12/4</a:t>
+              <a:t>2019/12/5</a:t>
             </a:fld>
             <a:endParaRPr lang="zh-CN" altLang="en-US"/>
           </a:p>
@@ -4269,6 +4269,7 @@
                 </a:extLst>
               </p:cNvPr>
               <p:cNvCxnSpPr>
+                <a:cxnSpLocks/>
                 <a:stCxn id="4" idx="4"/>
                 <a:endCxn id="6" idx="0"/>
               </p:cNvCxnSpPr>
@@ -4411,7 +4412,7 @@
             </p:nvSpPr>
             <p:spPr>
               <a:xfrm>
-                <a:off x="2230993" y="3815148"/>
+                <a:off x="2266618" y="3815148"/>
                 <a:ext cx="1582484" cy="369332"/>
               </a:xfrm>
               <a:prstGeom prst="rect">
@@ -4899,6 +4900,7 @@
               </a:extLst>
             </p:cNvPr>
             <p:cNvCxnSpPr>
+              <a:cxnSpLocks/>
               <a:stCxn id="6" idx="6"/>
               <a:endCxn id="8" idx="2"/>
             </p:cNvCxnSpPr>
@@ -4941,6 +4943,7 @@
               </a:extLst>
             </p:cNvPr>
             <p:cNvCxnSpPr>
+              <a:cxnSpLocks/>
               <a:stCxn id="8" idx="3"/>
               <a:endCxn id="9" idx="1"/>
             </p:cNvCxnSpPr>
@@ -4990,14 +4993,6 @@
 <file path=ppt/slides/slide2.xml><?xml version="1.0" encoding="utf-8"?>
 <p:sld xmlns:a="http://schemas.openxmlformats.org/drawingml/2006/main" xmlns:r="http://schemas.openxmlformats.org/officeDocument/2006/relationships" xmlns:p="http://schemas.openxmlformats.org/presentationml/2006/main">
   <p:cSld>
-    <p:bg>
-      <p:bgPr>
-        <a:solidFill>
-          <a:schemeClr val="bg1"/>
-        </a:solidFill>
-        <a:effectLst/>
-      </p:bgPr>
-    </p:bg>
     <p:spTree>
       <p:nvGrpSpPr>
         <p:cNvPr id="1" name=""/>
@@ -5416,9 +5411,7 @@
               </a:prstGeom>
               <a:noFill/>
               <a:ln>
-                <a:solidFill>
-                  <a:schemeClr val="bg1"/>
-                </a:solidFill>
+                <a:noFill/>
               </a:ln>
             </p:spPr>
             <p:txBody>
@@ -5524,9 +5517,7 @@
               </a:prstGeom>
               <a:noFill/>
               <a:ln>
-                <a:solidFill>
-                  <a:schemeClr val="bg1"/>
-                </a:solidFill>
+                <a:noFill/>
               </a:ln>
             </p:spPr>
             <p:txBody>
@@ -5634,9 +5625,7 @@
               </a:prstGeom>
               <a:noFill/>
               <a:ln>
-                <a:solidFill>
-                  <a:schemeClr val="bg1"/>
-                </a:solidFill>
+                <a:noFill/>
               </a:ln>
             </p:spPr>
             <p:txBody>
@@ -5689,9 +5678,7 @@
               </a:prstGeom>
               <a:noFill/>
               <a:ln>
-                <a:solidFill>
-                  <a:schemeClr val="bg1"/>
-                </a:solidFill>
+                <a:noFill/>
               </a:ln>
             </p:spPr>
             <p:txBody>
@@ -5746,7 +5733,7 @@
             </p:nvSpPr>
             <p:spPr>
               <a:xfrm>
-                <a:off x="2230993" y="3815148"/>
+                <a:off x="2266618" y="3815148"/>
                 <a:ext cx="1582484" cy="369332"/>
               </a:xfrm>
               <a:prstGeom prst="rect">
@@ -5754,9 +5741,7 @@
               </a:prstGeom>
               <a:noFill/>
               <a:ln>
-                <a:solidFill>
-                  <a:schemeClr val="bg1"/>
-                </a:solidFill>
+                <a:noFill/>
               </a:ln>
             </p:spPr>
             <p:txBody>
@@ -5800,9 +5785,7 @@
               </a:prstGeom>
               <a:noFill/>
               <a:ln>
-                <a:solidFill>
-                  <a:schemeClr val="bg1"/>
-                </a:solidFill>
+                <a:noFill/>
               </a:ln>
             </p:spPr>
             <p:txBody>
@@ -5866,9 +5849,7 @@
               </a:prstGeom>
               <a:noFill/>
               <a:ln>
-                <a:solidFill>
-                  <a:schemeClr val="bg1"/>
-                </a:solidFill>
+                <a:noFill/>
               </a:ln>
             </p:spPr>
             <p:txBody>
@@ -5936,9 +5917,7 @@
               </a:prstGeom>
               <a:noFill/>
               <a:ln>
-                <a:solidFill>
-                  <a:schemeClr val="bg1"/>
-                </a:solidFill>
+                <a:noFill/>
               </a:ln>
             </p:spPr>
             <p:txBody>

</xml_diff>

<commit_message>
Move news to the front page
</commit_message>
<xml_diff>
--- a/en/asset/mai-arch.pptx
+++ b/en/asset/mai-arch.pptx
@@ -198,7 +198,7 @@
           <a:p>
             <a:fld id="{B026110B-5B1F-4063-BCA6-030140F75AD4}" type="datetimeFigureOut">
               <a:rPr lang="zh-CN" altLang="en-US" smtClean="0"/>
-              <a:t>2019/12/5</a:t>
+              <a:t>2020/4/29</a:t>
             </a:fld>
             <a:endParaRPr lang="zh-CN" altLang="en-US"/>
           </a:p>
@@ -696,7 +696,7 @@
           <a:p>
             <a:fld id="{F5070D61-C366-4358-8D3B-3705082AF76F}" type="datetimeFigureOut">
               <a:rPr lang="zh-CN" altLang="en-US" smtClean="0"/>
-              <a:t>2019/12/5</a:t>
+              <a:t>2020/4/29</a:t>
             </a:fld>
             <a:endParaRPr lang="zh-CN" altLang="en-US"/>
           </a:p>
@@ -894,7 +894,7 @@
           <a:p>
             <a:fld id="{F5070D61-C366-4358-8D3B-3705082AF76F}" type="datetimeFigureOut">
               <a:rPr lang="zh-CN" altLang="en-US" smtClean="0"/>
-              <a:t>2019/12/5</a:t>
+              <a:t>2020/4/29</a:t>
             </a:fld>
             <a:endParaRPr lang="zh-CN" altLang="en-US"/>
           </a:p>
@@ -1102,7 +1102,7 @@
           <a:p>
             <a:fld id="{F5070D61-C366-4358-8D3B-3705082AF76F}" type="datetimeFigureOut">
               <a:rPr lang="zh-CN" altLang="en-US" smtClean="0"/>
-              <a:t>2019/12/5</a:t>
+              <a:t>2020/4/29</a:t>
             </a:fld>
             <a:endParaRPr lang="zh-CN" altLang="en-US"/>
           </a:p>
@@ -1300,7 +1300,7 @@
           <a:p>
             <a:fld id="{F5070D61-C366-4358-8D3B-3705082AF76F}" type="datetimeFigureOut">
               <a:rPr lang="zh-CN" altLang="en-US" smtClean="0"/>
-              <a:t>2019/12/5</a:t>
+              <a:t>2020/4/29</a:t>
             </a:fld>
             <a:endParaRPr lang="zh-CN" altLang="en-US"/>
           </a:p>
@@ -1575,7 +1575,7 @@
           <a:p>
             <a:fld id="{F5070D61-C366-4358-8D3B-3705082AF76F}" type="datetimeFigureOut">
               <a:rPr lang="zh-CN" altLang="en-US" smtClean="0"/>
-              <a:t>2019/12/5</a:t>
+              <a:t>2020/4/29</a:t>
             </a:fld>
             <a:endParaRPr lang="zh-CN" altLang="en-US"/>
           </a:p>
@@ -1840,7 +1840,7 @@
           <a:p>
             <a:fld id="{F5070D61-C366-4358-8D3B-3705082AF76F}" type="datetimeFigureOut">
               <a:rPr lang="zh-CN" altLang="en-US" smtClean="0"/>
-              <a:t>2019/12/5</a:t>
+              <a:t>2020/4/29</a:t>
             </a:fld>
             <a:endParaRPr lang="zh-CN" altLang="en-US"/>
           </a:p>
@@ -2252,7 +2252,7 @@
           <a:p>
             <a:fld id="{F5070D61-C366-4358-8D3B-3705082AF76F}" type="datetimeFigureOut">
               <a:rPr lang="zh-CN" altLang="en-US" smtClean="0"/>
-              <a:t>2019/12/5</a:t>
+              <a:t>2020/4/29</a:t>
             </a:fld>
             <a:endParaRPr lang="zh-CN" altLang="en-US"/>
           </a:p>
@@ -2393,7 +2393,7 @@
           <a:p>
             <a:fld id="{F5070D61-C366-4358-8D3B-3705082AF76F}" type="datetimeFigureOut">
               <a:rPr lang="zh-CN" altLang="en-US" smtClean="0"/>
-              <a:t>2019/12/5</a:t>
+              <a:t>2020/4/29</a:t>
             </a:fld>
             <a:endParaRPr lang="zh-CN" altLang="en-US"/>
           </a:p>
@@ -2506,7 +2506,7 @@
           <a:p>
             <a:fld id="{F5070D61-C366-4358-8D3B-3705082AF76F}" type="datetimeFigureOut">
               <a:rPr lang="zh-CN" altLang="en-US" smtClean="0"/>
-              <a:t>2019/12/5</a:t>
+              <a:t>2020/4/29</a:t>
             </a:fld>
             <a:endParaRPr lang="zh-CN" altLang="en-US"/>
           </a:p>
@@ -2817,7 +2817,7 @@
           <a:p>
             <a:fld id="{F5070D61-C366-4358-8D3B-3705082AF76F}" type="datetimeFigureOut">
               <a:rPr lang="zh-CN" altLang="en-US" smtClean="0"/>
-              <a:t>2019/12/5</a:t>
+              <a:t>2020/4/29</a:t>
             </a:fld>
             <a:endParaRPr lang="zh-CN" altLang="en-US"/>
           </a:p>
@@ -3105,7 +3105,7 @@
           <a:p>
             <a:fld id="{F5070D61-C366-4358-8D3B-3705082AF76F}" type="datetimeFigureOut">
               <a:rPr lang="zh-CN" altLang="en-US" smtClean="0"/>
-              <a:t>2019/12/5</a:t>
+              <a:t>2020/4/29</a:t>
             </a:fld>
             <a:endParaRPr lang="zh-CN" altLang="en-US"/>
           </a:p>
@@ -3346,7 +3346,7 @@
           <a:p>
             <a:fld id="{F5070D61-C366-4358-8D3B-3705082AF76F}" type="datetimeFigureOut">
               <a:rPr lang="zh-CN" altLang="en-US" smtClean="0"/>
-              <a:t>2019/12/5</a:t>
+              <a:t>2020/4/29</a:t>
             </a:fld>
             <a:endParaRPr lang="zh-CN" altLang="en-US"/>
           </a:p>
@@ -3778,9 +3778,9 @@
         <p:grpSpPr>
           <a:xfrm>
             <a:off x="440788" y="559190"/>
-            <a:ext cx="11310424" cy="5739619"/>
+            <a:ext cx="11310424" cy="4918418"/>
             <a:chOff x="440788" y="559190"/>
-            <a:chExt cx="11310424" cy="5739619"/>
+            <a:chExt cx="11310424" cy="4918418"/>
           </a:xfrm>
         </p:grpSpPr>
         <p:grpSp>
@@ -3798,9 +3798,9 @@
           <p:grpSpPr>
             <a:xfrm>
               <a:off x="440788" y="559190"/>
-              <a:ext cx="11310424" cy="5739619"/>
+              <a:ext cx="11310424" cy="4918418"/>
               <a:chOff x="492369" y="351692"/>
-              <a:chExt cx="11310424" cy="5739619"/>
+              <a:chExt cx="11310424" cy="4918418"/>
             </a:xfrm>
             <a:noFill/>
           </p:grpSpPr>
@@ -3819,11 +3819,11 @@
             <p:spPr>
               <a:xfrm>
                 <a:off x="3709353" y="1028239"/>
-                <a:ext cx="5561247" cy="4206240"/>
+                <a:ext cx="5561247" cy="3898971"/>
               </a:xfrm>
               <a:prstGeom prst="roundRect">
                 <a:avLst>
-                  <a:gd name="adj" fmla="val 12988"/>
+                  <a:gd name="adj" fmla="val 8252"/>
                 </a:avLst>
               </a:prstGeom>
               <a:grpFill/>
@@ -4125,8 +4125,8 @@
             </p:nvSpPr>
             <p:spPr>
               <a:xfrm>
-                <a:off x="3259414" y="387276"/>
-                <a:ext cx="1159292" cy="369332"/>
+                <a:off x="3163610" y="387276"/>
+                <a:ext cx="1172116" cy="369332"/>
               </a:xfrm>
               <a:prstGeom prst="rect">
                 <a:avLst/>
@@ -4145,7 +4145,7 @@
                     <a:ea typeface="Source Sans Pro" panose="020B0503030403020204" pitchFamily="34" charset="0"/>
                     <a:cs typeface="Arial" panose="020B0604020202020204" pitchFamily="34" charset="0"/>
                   </a:rPr>
-                  <a:t>On </a:t>
+                  <a:t>On-</a:t>
                 </a:r>
                 <a:r>
                   <a:rPr lang="en-US" altLang="zh-CN" dirty="0">
@@ -4172,13 +4172,15 @@
                   </a:ext>
                 </a:extLst>
               </p:cNvPr>
-              <p:cNvCxnSpPr/>
+              <p:cNvCxnSpPr>
+                <a:cxnSpLocks/>
+              </p:cNvCxnSpPr>
               <p:nvPr/>
             </p:nvCxnSpPr>
             <p:spPr>
               <a:xfrm>
                 <a:off x="2948354" y="351692"/>
-                <a:ext cx="0" cy="5739619"/>
+                <a:ext cx="0" cy="4918418"/>
               </a:xfrm>
               <a:prstGeom prst="line">
                 <a:avLst/>
@@ -4222,7 +4224,7 @@
             </p:nvSpPr>
             <p:spPr>
               <a:xfrm>
-                <a:off x="2435200" y="1849697"/>
+                <a:off x="2372288" y="1849697"/>
                 <a:ext cx="1351652" cy="646331"/>
               </a:xfrm>
               <a:prstGeom prst="rect">
@@ -4412,7 +4414,7 @@
             </p:nvSpPr>
             <p:spPr>
               <a:xfrm>
-                <a:off x="2199943" y="3815148"/>
+                <a:off x="2191151" y="3815148"/>
                 <a:ext cx="1582484" cy="369332"/>
               </a:xfrm>
               <a:prstGeom prst="rect">
@@ -4450,8 +4452,8 @@
             </p:nvSpPr>
             <p:spPr>
               <a:xfrm>
-                <a:off x="494645" y="387276"/>
-                <a:ext cx="1148071" cy="369332"/>
+                <a:off x="1663066" y="387276"/>
+                <a:ext cx="1167948" cy="369332"/>
               </a:xfrm>
               <a:prstGeom prst="rect">
                 <a:avLst/>
@@ -4470,7 +4472,7 @@
                     <a:ea typeface="Source Sans Pro" panose="020B0503030403020204" pitchFamily="34" charset="0"/>
                     <a:cs typeface="Arial" panose="020B0604020202020204" pitchFamily="34" charset="0"/>
                   </a:rPr>
-                  <a:t>Off </a:t>
+                  <a:t>Off-</a:t>
                 </a:r>
                 <a:r>
                   <a:rPr lang="en-US" altLang="zh-CN" dirty="0">
@@ -4502,7 +4504,7 @@
             </p:nvSpPr>
             <p:spPr>
               <a:xfrm>
-                <a:off x="5930345" y="2198457"/>
+                <a:off x="5414130" y="1775839"/>
                 <a:ext cx="1056700" cy="923330"/>
               </a:xfrm>
               <a:prstGeom prst="rect">
@@ -4516,6 +4518,7 @@
               </a:bodyPr>
               <a:lstStyle/>
               <a:p>
+                <a:pPr algn="r"/>
                 <a:r>
                   <a:rPr lang="en-US" altLang="zh-CN" dirty="0">
                     <a:latin typeface="Arial" panose="020B0604020202020204" pitchFamily="34" charset="0"/>
@@ -4525,6 +4528,7 @@
                 </a:r>
               </a:p>
               <a:p>
+                <a:pPr algn="r"/>
                 <a:r>
                   <a:rPr lang="en-US" altLang="zh-CN" dirty="0">
                     <a:latin typeface="Arial" panose="020B0604020202020204" pitchFamily="34" charset="0"/>
@@ -4534,6 +4538,7 @@
                 </a:r>
               </a:p>
               <a:p>
+                <a:pPr algn="r"/>
                 <a:r>
                   <a:rPr lang="en-US" altLang="zh-CN" dirty="0">
                     <a:latin typeface="Arial" panose="020B0604020202020204" pitchFamily="34" charset="0"/>
@@ -4993,6 +4998,16 @@
 <file path=ppt/slides/slide2.xml><?xml version="1.0" encoding="utf-8"?>
 <p:sld xmlns:a="http://schemas.openxmlformats.org/drawingml/2006/main" xmlns:r="http://schemas.openxmlformats.org/officeDocument/2006/relationships" xmlns:p="http://schemas.openxmlformats.org/presentationml/2006/main">
   <p:cSld>
+    <p:bg>
+      <p:bgPr>
+        <a:solidFill>
+          <a:schemeClr val="accent1">
+            <a:lumMod val="50000"/>
+          </a:schemeClr>
+        </a:solidFill>
+        <a:effectLst/>
+      </p:bgPr>
+    </p:bg>
     <p:spTree>
       <p:nvGrpSpPr>
         <p:cNvPr id="1" name=""/>
@@ -5009,10 +5024,10 @@
       </p:grpSpPr>
       <p:grpSp>
         <p:nvGrpSpPr>
-          <p:cNvPr id="3" name="组合 2">
+          <p:cNvPr id="26" name="组合 25">
             <a:extLst>
               <a:ext uri="{FF2B5EF4-FFF2-40B4-BE49-F238E27FC236}">
-                <a16:creationId xmlns:a16="http://schemas.microsoft.com/office/drawing/2014/main" id="{5B773D05-28DF-48EC-A0F7-4141924CB75B}"/>
+                <a16:creationId xmlns:a16="http://schemas.microsoft.com/office/drawing/2014/main" id="{6E748C30-B21F-4700-B89A-C054BEBEF37A}"/>
               </a:ext>
             </a:extLst>
           </p:cNvPr>
@@ -5022,17 +5037,17 @@
         <p:grpSpPr>
           <a:xfrm>
             <a:off x="440788" y="559190"/>
-            <a:ext cx="11310424" cy="5739619"/>
+            <a:ext cx="11310424" cy="4918418"/>
             <a:chOff x="440788" y="559190"/>
-            <a:chExt cx="11310424" cy="5739619"/>
+            <a:chExt cx="11310424" cy="4918418"/>
           </a:xfrm>
         </p:grpSpPr>
         <p:grpSp>
           <p:nvGrpSpPr>
-            <p:cNvPr id="2" name="组合 1">
+            <p:cNvPr id="27" name="组合 26">
               <a:extLst>
                 <a:ext uri="{FF2B5EF4-FFF2-40B4-BE49-F238E27FC236}">
-                  <a16:creationId xmlns:a16="http://schemas.microsoft.com/office/drawing/2014/main" id="{A50B6FF4-74B8-4A9B-B0A5-2B9C077D8139}"/>
+                  <a16:creationId xmlns:a16="http://schemas.microsoft.com/office/drawing/2014/main" id="{E8246024-28C2-432B-8B89-5B906370539A}"/>
                 </a:ext>
               </a:extLst>
             </p:cNvPr>
@@ -5042,17 +5057,18 @@
           <p:grpSpPr>
             <a:xfrm>
               <a:off x="440788" y="559190"/>
-              <a:ext cx="11310424" cy="5739619"/>
+              <a:ext cx="11310424" cy="4918418"/>
               <a:chOff x="492369" y="351692"/>
-              <a:chExt cx="11310424" cy="5739619"/>
+              <a:chExt cx="11310424" cy="4918418"/>
             </a:xfrm>
+            <a:noFill/>
           </p:grpSpPr>
           <p:sp>
             <p:nvSpPr>
-              <p:cNvPr id="22" name="矩形: 圆角 21">
+              <p:cNvPr id="34" name="矩形: 圆角 33">
                 <a:extLst>
                   <a:ext uri="{FF2B5EF4-FFF2-40B4-BE49-F238E27FC236}">
-                    <a16:creationId xmlns:a16="http://schemas.microsoft.com/office/drawing/2014/main" id="{E653A227-7A55-41AE-B26A-C3ABB8F6705F}"/>
+                    <a16:creationId xmlns:a16="http://schemas.microsoft.com/office/drawing/2014/main" id="{ED403CE7-003F-4242-8E8D-CAACA55BB8A0}"/>
                   </a:ext>
                 </a:extLst>
               </p:cNvPr>
@@ -5062,14 +5078,14 @@
             <p:spPr>
               <a:xfrm>
                 <a:off x="3709353" y="1028239"/>
-                <a:ext cx="5561247" cy="4206240"/>
+                <a:ext cx="5561247" cy="3898971"/>
               </a:xfrm>
               <a:prstGeom prst="roundRect">
                 <a:avLst>
-                  <a:gd name="adj" fmla="val 12988"/>
+                  <a:gd name="adj" fmla="val 8252"/>
                 </a:avLst>
               </a:prstGeom>
-              <a:noFill/>
+              <a:grpFill/>
               <a:ln>
                 <a:solidFill>
                   <a:schemeClr val="bg1"/>
@@ -5109,10 +5125,10 @@
           </p:sp>
           <p:sp>
             <p:nvSpPr>
-              <p:cNvPr id="4" name="椭圆 3">
+              <p:cNvPr id="35" name="椭圆 34">
                 <a:extLst>
                   <a:ext uri="{FF2B5EF4-FFF2-40B4-BE49-F238E27FC236}">
-                    <a16:creationId xmlns:a16="http://schemas.microsoft.com/office/drawing/2014/main" id="{5078006F-1272-4C97-A568-5488F526E11F}"/>
+                    <a16:creationId xmlns:a16="http://schemas.microsoft.com/office/drawing/2014/main" id="{A8690DDC-6732-4BFF-A4A3-CB8B8B54BD75}"/>
                   </a:ext>
                 </a:extLst>
               </p:cNvPr>
@@ -5127,7 +5143,7 @@
               <a:prstGeom prst="ellipse">
                 <a:avLst/>
               </a:prstGeom>
-              <a:noFill/>
+              <a:grpFill/>
               <a:ln>
                 <a:solidFill>
                   <a:schemeClr val="bg1"/>
@@ -5177,10 +5193,10 @@
           </p:sp>
           <p:sp>
             <p:nvSpPr>
-              <p:cNvPr id="6" name="椭圆 5">
+              <p:cNvPr id="37" name="椭圆 36">
                 <a:extLst>
                   <a:ext uri="{FF2B5EF4-FFF2-40B4-BE49-F238E27FC236}">
-                    <a16:creationId xmlns:a16="http://schemas.microsoft.com/office/drawing/2014/main" id="{DFE8BB6D-944B-47D8-A989-9A77B2AF67DE}"/>
+                    <a16:creationId xmlns:a16="http://schemas.microsoft.com/office/drawing/2014/main" id="{DD781B80-BCE7-4BA2-8105-41C491738168}"/>
                   </a:ext>
                 </a:extLst>
               </p:cNvPr>
@@ -5195,7 +5211,7 @@
               <a:prstGeom prst="ellipse">
                 <a:avLst/>
               </a:prstGeom>
-              <a:noFill/>
+              <a:grpFill/>
               <a:ln>
                 <a:solidFill>
                   <a:schemeClr val="bg1"/>
@@ -5245,10 +5261,10 @@
           </p:sp>
           <p:sp>
             <p:nvSpPr>
-              <p:cNvPr id="8" name="矩形 7">
+              <p:cNvPr id="40" name="矩形 39">
                 <a:extLst>
                   <a:ext uri="{FF2B5EF4-FFF2-40B4-BE49-F238E27FC236}">
-                    <a16:creationId xmlns:a16="http://schemas.microsoft.com/office/drawing/2014/main" id="{A9E9D41C-A2BD-4393-81B9-C711573B3A84}"/>
+                    <a16:creationId xmlns:a16="http://schemas.microsoft.com/office/drawing/2014/main" id="{4F60865B-DC1A-448F-9AA5-1D36A9FC6712}"/>
                   </a:ext>
                 </a:extLst>
               </p:cNvPr>
@@ -5263,7 +5279,7 @@
               <a:prstGeom prst="rect">
                 <a:avLst/>
               </a:prstGeom>
-              <a:noFill/>
+              <a:grpFill/>
               <a:ln>
                 <a:solidFill>
                   <a:schemeClr val="bg1"/>
@@ -5318,10 +5334,10 @@
           </p:sp>
           <p:sp>
             <p:nvSpPr>
-              <p:cNvPr id="9" name="矩形 8">
+              <p:cNvPr id="41" name="矩形 40">
                 <a:extLst>
                   <a:ext uri="{FF2B5EF4-FFF2-40B4-BE49-F238E27FC236}">
-                    <a16:creationId xmlns:a16="http://schemas.microsoft.com/office/drawing/2014/main" id="{94AEDBFB-F59B-46D1-A626-129D6E572754}"/>
+                    <a16:creationId xmlns:a16="http://schemas.microsoft.com/office/drawing/2014/main" id="{5A30CC5F-4B35-40B1-BF20-6E07A0C6B7E3}"/>
                   </a:ext>
                 </a:extLst>
               </p:cNvPr>
@@ -5336,7 +5352,7 @@
               <a:prstGeom prst="rect">
                 <a:avLst/>
               </a:prstGeom>
-              <a:noFill/>
+              <a:grpFill/>
               <a:ln>
                 <a:solidFill>
                   <a:schemeClr val="bg1"/>
@@ -5391,10 +5407,10 @@
           </p:sp>
           <p:sp>
             <p:nvSpPr>
-              <p:cNvPr id="12" name="文本框 11">
+              <p:cNvPr id="42" name="文本框 41">
                 <a:extLst>
                   <a:ext uri="{FF2B5EF4-FFF2-40B4-BE49-F238E27FC236}">
-                    <a16:creationId xmlns:a16="http://schemas.microsoft.com/office/drawing/2014/main" id="{867A7F36-3EDA-4E1A-A334-9B90564A1878}"/>
+                    <a16:creationId xmlns:a16="http://schemas.microsoft.com/office/drawing/2014/main" id="{7D970B88-476C-41C9-A06E-6B5A5D33BCA5}"/>
                   </a:ext>
                 </a:extLst>
               </p:cNvPr>
@@ -5403,13 +5419,13 @@
             </p:nvSpPr>
             <p:spPr>
               <a:xfrm>
-                <a:off x="3259414" y="387276"/>
-                <a:ext cx="1159292" cy="369332"/>
+                <a:off x="3163610" y="387276"/>
+                <a:ext cx="1172116" cy="369332"/>
               </a:xfrm>
               <a:prstGeom prst="rect">
                 <a:avLst/>
               </a:prstGeom>
-              <a:noFill/>
+              <a:grpFill/>
               <a:ln>
                 <a:noFill/>
               </a:ln>
@@ -5429,7 +5445,7 @@
                     <a:ea typeface="Source Sans Pro" panose="020B0503030403020204" pitchFamily="34" charset="0"/>
                     <a:cs typeface="Arial" panose="020B0604020202020204" pitchFamily="34" charset="0"/>
                   </a:rPr>
-                  <a:t>On </a:t>
+                  <a:t>On-</a:t>
                 </a:r>
                 <a:r>
                   <a:rPr lang="en-US" altLang="zh-CN" dirty="0">
@@ -5455,27 +5471,32 @@
           </p:sp>
           <p:cxnSp>
             <p:nvCxnSpPr>
-              <p:cNvPr id="14" name="直接连接符 13">
+              <p:cNvPr id="43" name="直接连接符 42">
                 <a:extLst>
                   <a:ext uri="{FF2B5EF4-FFF2-40B4-BE49-F238E27FC236}">
-                    <a16:creationId xmlns:a16="http://schemas.microsoft.com/office/drawing/2014/main" id="{05B6961D-F156-4980-BCA7-314684E85BD2}"/>
+                    <a16:creationId xmlns:a16="http://schemas.microsoft.com/office/drawing/2014/main" id="{B16D33AA-E01F-4AE5-859E-07AE5A33C725}"/>
                   </a:ext>
                 </a:extLst>
               </p:cNvPr>
-              <p:cNvCxnSpPr/>
+              <p:cNvCxnSpPr>
+                <a:cxnSpLocks/>
+              </p:cNvCxnSpPr>
               <p:nvPr/>
             </p:nvCxnSpPr>
             <p:spPr>
               <a:xfrm>
                 <a:off x="2948354" y="351692"/>
-                <a:ext cx="0" cy="5739619"/>
+                <a:ext cx="0" cy="4918418"/>
               </a:xfrm>
               <a:prstGeom prst="line">
                 <a:avLst/>
               </a:prstGeom>
+              <a:grpFill/>
               <a:ln w="19050">
                 <a:solidFill>
-                  <a:schemeClr val="bg1"/>
+                  <a:schemeClr val="bg1">
+                    <a:lumMod val="75000"/>
+                  </a:schemeClr>
                 </a:solidFill>
                 <a:prstDash val="lgDash"/>
               </a:ln>
@@ -5497,10 +5518,10 @@
           </p:cxnSp>
           <p:sp>
             <p:nvSpPr>
-              <p:cNvPr id="19" name="文本框 18">
+              <p:cNvPr id="44" name="文本框 43">
                 <a:extLst>
                   <a:ext uri="{FF2B5EF4-FFF2-40B4-BE49-F238E27FC236}">
-                    <a16:creationId xmlns:a16="http://schemas.microsoft.com/office/drawing/2014/main" id="{585BDEE7-9244-4881-9C40-B2E6B8A05941}"/>
+                    <a16:creationId xmlns:a16="http://schemas.microsoft.com/office/drawing/2014/main" id="{B379552E-DA26-4DE0-9CA8-C909FCF14F35}"/>
                   </a:ext>
                 </a:extLst>
               </p:cNvPr>
@@ -5509,13 +5530,13 @@
             </p:nvSpPr>
             <p:spPr>
               <a:xfrm>
-                <a:off x="2435200" y="1849697"/>
+                <a:off x="2372288" y="1849697"/>
                 <a:ext cx="1351652" cy="646331"/>
               </a:xfrm>
               <a:prstGeom prst="rect">
                 <a:avLst/>
               </a:prstGeom>
-              <a:noFill/>
+              <a:grpFill/>
               <a:ln>
                 <a:noFill/>
               </a:ln>
@@ -5560,16 +5581,17 @@
           </p:sp>
           <p:cxnSp>
             <p:nvCxnSpPr>
-              <p:cNvPr id="21" name="直接箭头连接符 20">
+              <p:cNvPr id="45" name="直接箭头连接符 44">
                 <a:extLst>
                   <a:ext uri="{FF2B5EF4-FFF2-40B4-BE49-F238E27FC236}">
-                    <a16:creationId xmlns:a16="http://schemas.microsoft.com/office/drawing/2014/main" id="{CF211737-CA3E-4515-8610-85695A51972D}"/>
+                    <a16:creationId xmlns:a16="http://schemas.microsoft.com/office/drawing/2014/main" id="{4D1B9BCC-679C-4EC9-9EB5-68AB77A33DD5}"/>
                   </a:ext>
                 </a:extLst>
               </p:cNvPr>
               <p:cNvCxnSpPr>
-                <a:stCxn id="4" idx="4"/>
-                <a:endCxn id="6" idx="0"/>
+                <a:cxnSpLocks/>
+                <a:stCxn id="35" idx="4"/>
+                <a:endCxn id="37" idx="0"/>
               </p:cNvCxnSpPr>
               <p:nvPr/>
             </p:nvCxnSpPr>
@@ -5581,6 +5603,7 @@
               <a:prstGeom prst="straightConnector1">
                 <a:avLst/>
               </a:prstGeom>
+              <a:grpFill/>
               <a:ln>
                 <a:solidFill>
                   <a:schemeClr val="bg1"/>
@@ -5605,10 +5628,10 @@
           </p:cxnSp>
           <p:sp>
             <p:nvSpPr>
-              <p:cNvPr id="23" name="文本框 22">
+              <p:cNvPr id="46" name="文本框 45">
                 <a:extLst>
                   <a:ext uri="{FF2B5EF4-FFF2-40B4-BE49-F238E27FC236}">
-                    <a16:creationId xmlns:a16="http://schemas.microsoft.com/office/drawing/2014/main" id="{8F9474AC-B070-4C29-8166-80EE686906D2}"/>
+                    <a16:creationId xmlns:a16="http://schemas.microsoft.com/office/drawing/2014/main" id="{82D21A66-93F5-47A4-AE4F-A3EB7217281C}"/>
                   </a:ext>
                 </a:extLst>
               </p:cNvPr>
@@ -5623,7 +5646,7 @@
               <a:prstGeom prst="rect">
                 <a:avLst/>
               </a:prstGeom>
-              <a:noFill/>
+              <a:grpFill/>
               <a:ln>
                 <a:noFill/>
               </a:ln>
@@ -5658,10 +5681,10 @@
           </p:sp>
           <p:sp>
             <p:nvSpPr>
-              <p:cNvPr id="29" name="文本框 28">
+              <p:cNvPr id="47" name="文本框 46">
                 <a:extLst>
                   <a:ext uri="{FF2B5EF4-FFF2-40B4-BE49-F238E27FC236}">
-                    <a16:creationId xmlns:a16="http://schemas.microsoft.com/office/drawing/2014/main" id="{BD66B20F-20FB-479E-A62D-A49E69DF648E}"/>
+                    <a16:creationId xmlns:a16="http://schemas.microsoft.com/office/drawing/2014/main" id="{D010F63C-6D47-4388-9160-FD902A311B12}"/>
                   </a:ext>
                 </a:extLst>
               </p:cNvPr>
@@ -5676,7 +5699,7 @@
               <a:prstGeom prst="rect">
                 <a:avLst/>
               </a:prstGeom>
-              <a:noFill/>
+              <a:grpFill/>
               <a:ln>
                 <a:noFill/>
               </a:ln>
@@ -5721,10 +5744,10 @@
           </p:sp>
           <p:sp>
             <p:nvSpPr>
-              <p:cNvPr id="30" name="文本框 29">
+              <p:cNvPr id="50" name="文本框 49">
                 <a:extLst>
                   <a:ext uri="{FF2B5EF4-FFF2-40B4-BE49-F238E27FC236}">
-                    <a16:creationId xmlns:a16="http://schemas.microsoft.com/office/drawing/2014/main" id="{7C9E0E53-8064-4E2A-AD26-CD4E6C3DBD9A}"/>
+                    <a16:creationId xmlns:a16="http://schemas.microsoft.com/office/drawing/2014/main" id="{D46FEBB6-F914-47CE-86E7-146788355528}"/>
                   </a:ext>
                 </a:extLst>
               </p:cNvPr>
@@ -5733,13 +5756,13 @@
             </p:nvSpPr>
             <p:spPr>
               <a:xfrm>
-                <a:off x="2199943" y="3815148"/>
+                <a:off x="2191151" y="3815148"/>
                 <a:ext cx="1582484" cy="369332"/>
               </a:xfrm>
               <a:prstGeom prst="rect">
                 <a:avLst/>
               </a:prstGeom>
-              <a:noFill/>
+              <a:grpFill/>
               <a:ln>
                 <a:noFill/>
               </a:ln>
@@ -5765,10 +5788,10 @@
           </p:sp>
           <p:sp>
             <p:nvSpPr>
-              <p:cNvPr id="38" name="文本框 37">
+              <p:cNvPr id="51" name="文本框 50">
                 <a:extLst>
                   <a:ext uri="{FF2B5EF4-FFF2-40B4-BE49-F238E27FC236}">
-                    <a16:creationId xmlns:a16="http://schemas.microsoft.com/office/drawing/2014/main" id="{431921B8-FBEB-499E-B342-FDB6752B4842}"/>
+                    <a16:creationId xmlns:a16="http://schemas.microsoft.com/office/drawing/2014/main" id="{3EAB26B7-9A69-4E97-89E3-76F57EE8DED8}"/>
                   </a:ext>
                 </a:extLst>
               </p:cNvPr>
@@ -5777,13 +5800,13 @@
             </p:nvSpPr>
             <p:spPr>
               <a:xfrm>
-                <a:off x="494645" y="387276"/>
-                <a:ext cx="1148071" cy="369332"/>
+                <a:off x="1663066" y="387276"/>
+                <a:ext cx="1167948" cy="369332"/>
               </a:xfrm>
               <a:prstGeom prst="rect">
                 <a:avLst/>
               </a:prstGeom>
-              <a:noFill/>
+              <a:grpFill/>
               <a:ln>
                 <a:noFill/>
               </a:ln>
@@ -5803,7 +5826,7 @@
                     <a:ea typeface="Source Sans Pro" panose="020B0503030403020204" pitchFamily="34" charset="0"/>
                     <a:cs typeface="Arial" panose="020B0604020202020204" pitchFamily="34" charset="0"/>
                   </a:rPr>
-                  <a:t>Off </a:t>
+                  <a:t>Off-</a:t>
                 </a:r>
                 <a:r>
                   <a:rPr lang="en-US" altLang="zh-CN" dirty="0">
@@ -5829,10 +5852,10 @@
           </p:sp>
           <p:sp>
             <p:nvSpPr>
-              <p:cNvPr id="48" name="文本框 47">
+              <p:cNvPr id="52" name="文本框 51">
                 <a:extLst>
                   <a:ext uri="{FF2B5EF4-FFF2-40B4-BE49-F238E27FC236}">
-                    <a16:creationId xmlns:a16="http://schemas.microsoft.com/office/drawing/2014/main" id="{3806FC64-D5E2-41E7-A82A-DD132EB2E9E8}"/>
+                    <a16:creationId xmlns:a16="http://schemas.microsoft.com/office/drawing/2014/main" id="{80BA3474-318D-4815-842D-D8C9D687D802}"/>
                   </a:ext>
                 </a:extLst>
               </p:cNvPr>
@@ -5841,13 +5864,13 @@
             </p:nvSpPr>
             <p:spPr>
               <a:xfrm>
-                <a:off x="5930345" y="2198457"/>
+                <a:off x="5414130" y="1775839"/>
                 <a:ext cx="1056700" cy="923330"/>
               </a:xfrm>
               <a:prstGeom prst="rect">
                 <a:avLst/>
               </a:prstGeom>
-              <a:noFill/>
+              <a:grpFill/>
               <a:ln>
                 <a:noFill/>
               </a:ln>
@@ -5858,6 +5881,7 @@
               </a:bodyPr>
               <a:lstStyle/>
               <a:p>
+                <a:pPr algn="r"/>
                 <a:r>
                   <a:rPr lang="en-US" altLang="zh-CN" dirty="0">
                     <a:solidFill>
@@ -5870,6 +5894,7 @@
                 </a:r>
               </a:p>
               <a:p>
+                <a:pPr algn="r"/>
                 <a:r>
                   <a:rPr lang="en-US" altLang="zh-CN" dirty="0">
                     <a:solidFill>
@@ -5882,6 +5907,7 @@
                 </a:r>
               </a:p>
               <a:p>
+                <a:pPr algn="r"/>
                 <a:r>
                   <a:rPr lang="en-US" altLang="zh-CN" dirty="0">
                     <a:solidFill>
@@ -5897,10 +5923,10 @@
           </p:sp>
           <p:sp>
             <p:nvSpPr>
-              <p:cNvPr id="49" name="文本框 48">
+              <p:cNvPr id="53" name="文本框 52">
                 <a:extLst>
                   <a:ext uri="{FF2B5EF4-FFF2-40B4-BE49-F238E27FC236}">
-                    <a16:creationId xmlns:a16="http://schemas.microsoft.com/office/drawing/2014/main" id="{2B7441E1-87E6-4066-A1D4-CDD1C29A9F90}"/>
+                    <a16:creationId xmlns:a16="http://schemas.microsoft.com/office/drawing/2014/main" id="{7273DDB7-7146-4CDB-BB40-44040AFD94E1}"/>
                   </a:ext>
                 </a:extLst>
               </p:cNvPr>
@@ -5915,7 +5941,7 @@
               <a:prstGeom prst="rect">
                 <a:avLst/>
               </a:prstGeom>
-              <a:noFill/>
+              <a:grpFill/>
               <a:ln>
                 <a:noFill/>
               </a:ln>
@@ -5965,16 +5991,16 @@
           </p:sp>
           <p:cxnSp>
             <p:nvCxnSpPr>
-              <p:cNvPr id="56" name="连接符: 肘形 55">
+              <p:cNvPr id="54" name="连接符: 肘形 53">
                 <a:extLst>
                   <a:ext uri="{FF2B5EF4-FFF2-40B4-BE49-F238E27FC236}">
-                    <a16:creationId xmlns:a16="http://schemas.microsoft.com/office/drawing/2014/main" id="{41CE204E-F615-43F9-B8D3-F4D0769AA729}"/>
+                    <a16:creationId xmlns:a16="http://schemas.microsoft.com/office/drawing/2014/main" id="{A7B8E3D4-29BA-44A5-884E-922C0ECE14A5}"/>
                   </a:ext>
                 </a:extLst>
               </p:cNvPr>
               <p:cNvCxnSpPr>
                 <a:cxnSpLocks/>
-                <a:stCxn id="9" idx="3"/>
+                <a:stCxn id="41" idx="3"/>
               </p:cNvCxnSpPr>
               <p:nvPr/>
             </p:nvCxnSpPr>
@@ -5986,6 +6012,7 @@
               <a:prstGeom prst="bentConnector2">
                 <a:avLst/>
               </a:prstGeom>
+              <a:grpFill/>
               <a:ln>
                 <a:solidFill>
                   <a:schemeClr val="bg1"/>
@@ -6010,10 +6037,10 @@
           </p:cxnSp>
           <p:sp>
             <p:nvSpPr>
-              <p:cNvPr id="59" name="圆柱体 58">
+              <p:cNvPr id="55" name="圆柱体 54">
                 <a:extLst>
                   <a:ext uri="{FF2B5EF4-FFF2-40B4-BE49-F238E27FC236}">
-                    <a16:creationId xmlns:a16="http://schemas.microsoft.com/office/drawing/2014/main" id="{25632116-1E00-4712-B8B0-81515F3E9106}"/>
+                    <a16:creationId xmlns:a16="http://schemas.microsoft.com/office/drawing/2014/main" id="{F2D3B38F-AB9D-4C7F-9554-75F95B8607B3}"/>
                   </a:ext>
                 </a:extLst>
               </p:cNvPr>
@@ -6028,7 +6055,7 @@
               <a:prstGeom prst="can">
                 <a:avLst/>
               </a:prstGeom>
-              <a:noFill/>
+              <a:grpFill/>
               <a:ln>
                 <a:solidFill>
                   <a:schemeClr val="bg1"/>
@@ -6102,10 +6129,10 @@
           </p:sp>
           <p:sp>
             <p:nvSpPr>
-              <p:cNvPr id="62" name="左大括号 61">
+              <p:cNvPr id="57" name="左大括号 56">
                 <a:extLst>
                   <a:ext uri="{FF2B5EF4-FFF2-40B4-BE49-F238E27FC236}">
-                    <a16:creationId xmlns:a16="http://schemas.microsoft.com/office/drawing/2014/main" id="{B37ADC2E-AA1F-4233-A03B-306C7CF4C764}"/>
+                    <a16:creationId xmlns:a16="http://schemas.microsoft.com/office/drawing/2014/main" id="{8E2E87D9-4E78-45F6-B539-AE44D4E24370}"/>
                   </a:ext>
                 </a:extLst>
               </p:cNvPr>
@@ -6123,6 +6150,7 @@
                   <a:gd name="adj2" fmla="val 50000"/>
                 </a:avLst>
               </a:prstGeom>
+              <a:grpFill/>
               <a:ln>
                 <a:solidFill>
                   <a:schemeClr val="bg1"/>
@@ -6160,10 +6188,10 @@
           </p:sp>
           <p:sp>
             <p:nvSpPr>
-              <p:cNvPr id="63" name="矩形: 圆角 62">
+              <p:cNvPr id="58" name="矩形: 圆角 57">
                 <a:extLst>
                   <a:ext uri="{FF2B5EF4-FFF2-40B4-BE49-F238E27FC236}">
-                    <a16:creationId xmlns:a16="http://schemas.microsoft.com/office/drawing/2014/main" id="{C69C2873-0B56-4824-B189-2682AA773FF2}"/>
+                    <a16:creationId xmlns:a16="http://schemas.microsoft.com/office/drawing/2014/main" id="{6FB68AAF-26E7-4D99-8074-0514F57F7122}"/>
                   </a:ext>
                 </a:extLst>
               </p:cNvPr>
@@ -6180,7 +6208,7 @@
                   <a:gd name="adj" fmla="val 33590"/>
                 </a:avLst>
               </a:prstGeom>
-              <a:noFill/>
+              <a:grpFill/>
               <a:ln>
                 <a:solidFill>
                   <a:schemeClr val="bg1"/>
@@ -6238,17 +6266,17 @@
         </p:grpSp>
         <p:cxnSp>
           <p:nvCxnSpPr>
-            <p:cNvPr id="33" name="连接符: 肘形 32">
+            <p:cNvPr id="28" name="连接符: 肘形 27">
               <a:extLst>
                 <a:ext uri="{FF2B5EF4-FFF2-40B4-BE49-F238E27FC236}">
-                  <a16:creationId xmlns:a16="http://schemas.microsoft.com/office/drawing/2014/main" id="{098AD45F-AF8B-4B74-A9D4-99DE4E87CDB5}"/>
+                  <a16:creationId xmlns:a16="http://schemas.microsoft.com/office/drawing/2014/main" id="{9B49CAF7-4831-46B7-A675-3E0FA7B2C972}"/>
                 </a:ext>
               </a:extLst>
             </p:cNvPr>
             <p:cNvCxnSpPr>
               <a:cxnSpLocks/>
-              <a:stCxn id="4" idx="6"/>
-              <a:endCxn id="8" idx="0"/>
+              <a:stCxn id="35" idx="6"/>
+              <a:endCxn id="40" idx="0"/>
             </p:cNvCxnSpPr>
             <p:nvPr/>
           </p:nvCxnSpPr>
@@ -6284,16 +6312,17 @@
         </p:cxnSp>
         <p:cxnSp>
           <p:nvCxnSpPr>
-            <p:cNvPr id="36" name="连接符: 肘形 35">
+            <p:cNvPr id="31" name="连接符: 肘形 30">
               <a:extLst>
                 <a:ext uri="{FF2B5EF4-FFF2-40B4-BE49-F238E27FC236}">
-                  <a16:creationId xmlns:a16="http://schemas.microsoft.com/office/drawing/2014/main" id="{AD784253-2D17-429C-AF32-B5F69BE90057}"/>
+                  <a16:creationId xmlns:a16="http://schemas.microsoft.com/office/drawing/2014/main" id="{583543EE-4074-45CE-B4E6-E7353E3C693F}"/>
                 </a:ext>
               </a:extLst>
             </p:cNvPr>
             <p:cNvCxnSpPr>
-              <a:stCxn id="6" idx="6"/>
-              <a:endCxn id="8" idx="2"/>
+              <a:cxnSpLocks/>
+              <a:stCxn id="37" idx="6"/>
+              <a:endCxn id="40" idx="2"/>
             </p:cNvCxnSpPr>
             <p:nvPr/>
           </p:nvCxnSpPr>
@@ -6329,16 +6358,17 @@
         </p:cxnSp>
         <p:cxnSp>
           <p:nvCxnSpPr>
-            <p:cNvPr id="39" name="连接符: 肘形 38">
+            <p:cNvPr id="32" name="连接符: 肘形 31">
               <a:extLst>
                 <a:ext uri="{FF2B5EF4-FFF2-40B4-BE49-F238E27FC236}">
-                  <a16:creationId xmlns:a16="http://schemas.microsoft.com/office/drawing/2014/main" id="{9B05B99D-7973-4ED9-9D32-DCABAE89326C}"/>
+                  <a16:creationId xmlns:a16="http://schemas.microsoft.com/office/drawing/2014/main" id="{760EC8E0-6E90-4442-8360-155A84CEF8A1}"/>
                 </a:ext>
               </a:extLst>
             </p:cNvPr>
             <p:cNvCxnSpPr>
-              <a:stCxn id="8" idx="3"/>
-              <a:endCxn id="9" idx="1"/>
+              <a:cxnSpLocks/>
+              <a:stCxn id="40" idx="3"/>
+              <a:endCxn id="41" idx="1"/>
             </p:cNvCxnSpPr>
             <p:nvPr/>
           </p:nvCxnSpPr>

</xml_diff>